<commit_message>
Most recent R workflow
</commit_message>
<xml_diff>
--- a/R_workflow.pptx
+++ b/R_workflow.pptx
@@ -116,7 +116,7 @@
 <file path=ppt/revisionInfo.xml><?xml version="1.0" encoding="utf-8"?>
 <p1510:revInfo xmlns:a="http://schemas.openxmlformats.org/drawingml/2006/main" xmlns:r="http://schemas.openxmlformats.org/officeDocument/2006/relationships" xmlns:p1510="http://schemas.microsoft.com/office/powerpoint/2015/10/main">
   <p1510:revLst>
-    <p1510:client id="{AB9D2D21-D886-4318-9D64-1D8ACC6BB95E}" v="37" dt="2022-06-21T00:47:59.063"/>
+    <p1510:client id="{64AE714D-37AE-4D42-80C0-A13615862662}" v="17" dt="2022-07-11T23:54:16.651"/>
   </p1510:revLst>
 </p1510:revInfo>
 </file>
@@ -824,7 +824,7 @@
           <a:p>
             <a:fld id="{C8820164-EF9E-45FC-8091-048CACBAAEBD}" type="datetimeFigureOut">
               <a:rPr lang="en-US" smtClean="0"/>
-              <a:t>6/20/2022</a:t>
+              <a:t>7/11/2022</a:t>
             </a:fld>
             <a:endParaRPr lang="en-US"/>
           </a:p>
@@ -994,7 +994,7 @@
           <a:p>
             <a:fld id="{C8820164-EF9E-45FC-8091-048CACBAAEBD}" type="datetimeFigureOut">
               <a:rPr lang="en-US" smtClean="0"/>
-              <a:t>6/20/2022</a:t>
+              <a:t>7/11/2022</a:t>
             </a:fld>
             <a:endParaRPr lang="en-US"/>
           </a:p>
@@ -1174,7 +1174,7 @@
           <a:p>
             <a:fld id="{C8820164-EF9E-45FC-8091-048CACBAAEBD}" type="datetimeFigureOut">
               <a:rPr lang="en-US" smtClean="0"/>
-              <a:t>6/20/2022</a:t>
+              <a:t>7/11/2022</a:t>
             </a:fld>
             <a:endParaRPr lang="en-US"/>
           </a:p>
@@ -1344,7 +1344,7 @@
           <a:p>
             <a:fld id="{C8820164-EF9E-45FC-8091-048CACBAAEBD}" type="datetimeFigureOut">
               <a:rPr lang="en-US" smtClean="0"/>
-              <a:t>6/20/2022</a:t>
+              <a:t>7/11/2022</a:t>
             </a:fld>
             <a:endParaRPr lang="en-US"/>
           </a:p>
@@ -1588,7 +1588,7 @@
           <a:p>
             <a:fld id="{C8820164-EF9E-45FC-8091-048CACBAAEBD}" type="datetimeFigureOut">
               <a:rPr lang="en-US" smtClean="0"/>
-              <a:t>6/20/2022</a:t>
+              <a:t>7/11/2022</a:t>
             </a:fld>
             <a:endParaRPr lang="en-US"/>
           </a:p>
@@ -1820,7 +1820,7 @@
           <a:p>
             <a:fld id="{C8820164-EF9E-45FC-8091-048CACBAAEBD}" type="datetimeFigureOut">
               <a:rPr lang="en-US" smtClean="0"/>
-              <a:t>6/20/2022</a:t>
+              <a:t>7/11/2022</a:t>
             </a:fld>
             <a:endParaRPr lang="en-US"/>
           </a:p>
@@ -2187,7 +2187,7 @@
           <a:p>
             <a:fld id="{C8820164-EF9E-45FC-8091-048CACBAAEBD}" type="datetimeFigureOut">
               <a:rPr lang="en-US" smtClean="0"/>
-              <a:t>6/20/2022</a:t>
+              <a:t>7/11/2022</a:t>
             </a:fld>
             <a:endParaRPr lang="en-US"/>
           </a:p>
@@ -2305,7 +2305,7 @@
           <a:p>
             <a:fld id="{C8820164-EF9E-45FC-8091-048CACBAAEBD}" type="datetimeFigureOut">
               <a:rPr lang="en-US" smtClean="0"/>
-              <a:t>6/20/2022</a:t>
+              <a:t>7/11/2022</a:t>
             </a:fld>
             <a:endParaRPr lang="en-US"/>
           </a:p>
@@ -2400,7 +2400,7 @@
           <a:p>
             <a:fld id="{C8820164-EF9E-45FC-8091-048CACBAAEBD}" type="datetimeFigureOut">
               <a:rPr lang="en-US" smtClean="0"/>
-              <a:t>6/20/2022</a:t>
+              <a:t>7/11/2022</a:t>
             </a:fld>
             <a:endParaRPr lang="en-US"/>
           </a:p>
@@ -2677,7 +2677,7 @@
           <a:p>
             <a:fld id="{C8820164-EF9E-45FC-8091-048CACBAAEBD}" type="datetimeFigureOut">
               <a:rPr lang="en-US" smtClean="0"/>
-              <a:t>6/20/2022</a:t>
+              <a:t>7/11/2022</a:t>
             </a:fld>
             <a:endParaRPr lang="en-US"/>
           </a:p>
@@ -2934,7 +2934,7 @@
           <a:p>
             <a:fld id="{C8820164-EF9E-45FC-8091-048CACBAAEBD}" type="datetimeFigureOut">
               <a:rPr lang="en-US" smtClean="0"/>
-              <a:t>6/20/2022</a:t>
+              <a:t>7/11/2022</a:t>
             </a:fld>
             <a:endParaRPr lang="en-US"/>
           </a:p>
@@ -3147,7 +3147,7 @@
           <a:p>
             <a:fld id="{C8820164-EF9E-45FC-8091-048CACBAAEBD}" type="datetimeFigureOut">
               <a:rPr lang="en-US" smtClean="0"/>
-              <a:t>6/20/2022</a:t>
+              <a:t>7/11/2022</a:t>
             </a:fld>
             <a:endParaRPr lang="en-US"/>
           </a:p>
@@ -3566,7 +3566,7 @@
         </p:nvSpPr>
         <p:spPr>
           <a:xfrm>
-            <a:off x="212997" y="8051800"/>
+            <a:off x="212997" y="6992258"/>
             <a:ext cx="2086855" cy="1049226"/>
           </a:xfrm>
           <a:prstGeom prst="rect">
@@ -3636,8 +3636,8 @@
         </p:nvSpPr>
         <p:spPr>
           <a:xfrm>
-            <a:off x="5947319" y="8093350"/>
-            <a:ext cx="2512718" cy="976267"/>
+            <a:off x="5947319" y="7033808"/>
+            <a:ext cx="2512718" cy="1129784"/>
           </a:xfrm>
           <a:prstGeom prst="rect">
             <a:avLst/>
@@ -3676,7 +3676,7 @@
           <a:p>
             <a:r>
               <a:rPr lang="en-US" sz="1200" dirty="0"/>
-              <a:t>1) </a:t>
+              <a:t>2) </a:t>
             </a:r>
             <a:r>
               <a:rPr lang="en-US" sz="1200" dirty="0" err="1"/>
@@ -3687,13 +3687,13 @@
           <a:p>
             <a:r>
               <a:rPr lang="en-US" sz="1200" dirty="0"/>
-              <a:t>2) f_clean_flow_usgs_11455420.R</a:t>
+              <a:t>3) f_clean_flow_usgs_11455420.R</a:t>
             </a:r>
           </a:p>
           <a:p>
             <a:r>
               <a:rPr lang="en-US" sz="1200" dirty="0"/>
-              <a:t>3) </a:t>
+              <a:t>4) </a:t>
             </a:r>
             <a:r>
               <a:rPr lang="en-US" sz="1200" dirty="0" err="1"/>
@@ -3717,7 +3717,7 @@
         </p:nvSpPr>
         <p:spPr>
           <a:xfrm>
-            <a:off x="3493964" y="5185703"/>
+            <a:off x="3493964" y="4126161"/>
             <a:ext cx="1691368" cy="1018896"/>
           </a:xfrm>
           <a:prstGeom prst="rect">
@@ -3781,7 +3781,7 @@
         </p:nvSpPr>
         <p:spPr>
           <a:xfrm>
-            <a:off x="3068488" y="9699619"/>
+            <a:off x="3068488" y="8640077"/>
             <a:ext cx="2542318" cy="1018896"/>
           </a:xfrm>
           <a:prstGeom prst="roundRect">
@@ -3917,7 +3917,7 @@
         </p:nvSpPr>
         <p:spPr>
           <a:xfrm>
-            <a:off x="11273227" y="9699618"/>
+            <a:off x="11273227" y="8640076"/>
             <a:ext cx="2755511" cy="714381"/>
           </a:xfrm>
           <a:prstGeom prst="roundRect">
@@ -4002,8 +4002,8 @@
         </p:nvSpPr>
         <p:spPr>
           <a:xfrm>
-            <a:off x="5825920" y="9742248"/>
-            <a:ext cx="2755511" cy="976267"/>
+            <a:off x="5724322" y="8682706"/>
+            <a:ext cx="2970628" cy="976267"/>
           </a:xfrm>
           <a:prstGeom prst="roundRect">
             <a:avLst/>
@@ -4039,33 +4039,55 @@
           <a:bodyPr rtlCol="0" anchor="ctr"/>
           <a:lstStyle/>
           <a:p>
+            <a:pPr marL="228600" indent="-228600">
+              <a:buAutoNum type="arabicParenR"/>
+            </a:pPr>
             <a:r>
               <a:rPr lang="en-US" sz="1200" dirty="0">
                 <a:solidFill>
                   <a:schemeClr val="tx1"/>
                 </a:solidFill>
               </a:rPr>
-              <a:t>1) clean_ lib_model_flow.csv</a:t>
-            </a:r>
-          </a:p>
-          <a:p>
+              <a:t>clean_flow_usgs_lib.csv</a:t>
+            </a:r>
+          </a:p>
+          <a:p>
+            <a:pPr marL="228600" indent="-228600">
+              <a:buAutoNum type="arabicParenR"/>
+            </a:pPr>
             <a:r>
               <a:rPr lang="en-US" sz="1200" dirty="0">
                 <a:solidFill>
                   <a:schemeClr val="tx1"/>
                 </a:solidFill>
               </a:rPr>
-              <a:t>2) clean_flow_tides_usgs_1145420.csv</a:t>
-            </a:r>
-          </a:p>
-          <a:p>
+              <a:t>clean_flow_usgs_cache.csv</a:t>
+            </a:r>
+          </a:p>
+          <a:p>
+            <a:pPr marL="228600" indent="-228600">
+              <a:buAutoNum type="arabicParenR"/>
+            </a:pPr>
             <a:r>
               <a:rPr lang="en-US" sz="1200" dirty="0">
                 <a:solidFill>
                   <a:schemeClr val="tx1"/>
                 </a:solidFill>
               </a:rPr>
-              <a:t>3) clean_flow_usgs_11425500.csv</a:t>
+              <a:t>clean_flow_usgs_1145420.csv</a:t>
+            </a:r>
+          </a:p>
+          <a:p>
+            <a:pPr marL="228600" indent="-228600">
+              <a:buAutoNum type="arabicParenR"/>
+            </a:pPr>
+            <a:r>
+              <a:rPr lang="en-US" sz="1200" dirty="0">
+                <a:solidFill>
+                  <a:schemeClr val="tx1"/>
+                </a:solidFill>
+              </a:rPr>
+              <a:t>clean_flow_tides_usgs_11425500.csv</a:t>
             </a:r>
           </a:p>
         </p:txBody>
@@ -4084,7 +4106,7 @@
         </p:nvSpPr>
         <p:spPr>
           <a:xfrm>
-            <a:off x="8892981" y="9719135"/>
+            <a:off x="8892981" y="8659593"/>
             <a:ext cx="1884235" cy="587296"/>
           </a:xfrm>
           <a:prstGeom prst="roundRect">
@@ -4147,7 +4169,7 @@
         </p:nvSpPr>
         <p:spPr>
           <a:xfrm>
-            <a:off x="212997" y="9579800"/>
+            <a:off x="212997" y="8520258"/>
             <a:ext cx="2298066" cy="1260003"/>
           </a:xfrm>
           <a:prstGeom prst="roundRect">
@@ -4253,7 +4275,7 @@
         </p:nvSpPr>
         <p:spPr>
           <a:xfrm>
-            <a:off x="8892981" y="8357933"/>
+            <a:off x="8892981" y="7298391"/>
             <a:ext cx="1884235" cy="709126"/>
           </a:xfrm>
           <a:prstGeom prst="rect">
@@ -4303,7 +4325,7 @@
         </p:nvSpPr>
         <p:spPr>
           <a:xfrm>
-            <a:off x="3068489" y="6858000"/>
+            <a:off x="3068489" y="5798458"/>
             <a:ext cx="2542318" cy="1018896"/>
           </a:xfrm>
           <a:prstGeom prst="roundRect">
@@ -4407,8 +4429,8 @@
         </p:nvSpPr>
         <p:spPr>
           <a:xfrm>
-            <a:off x="6026658" y="7048500"/>
-            <a:ext cx="2354037" cy="828396"/>
+            <a:off x="5986988" y="5811298"/>
+            <a:ext cx="2433379" cy="1018896"/>
           </a:xfrm>
           <a:prstGeom prst="roundRect">
             <a:avLst/>
@@ -4466,7 +4488,20 @@
                   <a:schemeClr val="tx1"/>
                 </a:solidFill>
               </a:rPr>
-              <a:t>raw_flow_usgs_11425500.csv</a:t>
+              <a:t>raw_flow_usgs_cache.csv</a:t>
+            </a:r>
+          </a:p>
+          <a:p>
+            <a:pPr marL="228600" indent="-228600">
+              <a:buAutoNum type="arabicParenR"/>
+            </a:pPr>
+            <a:r>
+              <a:rPr lang="en-US" sz="1200" dirty="0">
+                <a:solidFill>
+                  <a:schemeClr val="tx1"/>
+                </a:solidFill>
+              </a:rPr>
+              <a:t>raw_flow_usgs_11425420.csv</a:t>
             </a:r>
           </a:p>
           <a:p>
@@ -4498,7 +4533,7 @@
         </p:nvSpPr>
         <p:spPr>
           <a:xfrm>
-            <a:off x="11154959" y="8326284"/>
+            <a:off x="11154959" y="7266742"/>
             <a:ext cx="2992048" cy="756627"/>
           </a:xfrm>
           <a:prstGeom prst="rect">
@@ -4570,8 +4605,8 @@
         </p:nvSpPr>
         <p:spPr>
           <a:xfrm>
-            <a:off x="5947319" y="5302488"/>
-            <a:ext cx="2512718" cy="709126"/>
+            <a:off x="5947319" y="4123675"/>
+            <a:ext cx="2512718" cy="1018895"/>
           </a:xfrm>
           <a:prstGeom prst="rect">
             <a:avLst/>
@@ -4612,14 +4647,26 @@
             <a:pPr algn="ctr"/>
             <a:r>
               <a:rPr lang="en-US" sz="1200" dirty="0"/>
-              <a:t>2) f_get_flow_usgs_11455420.R</a:t>
-            </a:r>
+              <a:t>2) </a:t>
+            </a:r>
+            <a:r>
+              <a:rPr lang="en-US" sz="1200" dirty="0" err="1"/>
+              <a:t>f_get_flow_usgs_cache.R</a:t>
+            </a:r>
+            <a:endParaRPr lang="en-US" sz="1200" dirty="0"/>
           </a:p>
           <a:p>
             <a:pPr algn="ctr"/>
             <a:r>
               <a:rPr lang="en-US" sz="1200" dirty="0"/>
-              <a:t>3) </a:t>
+              <a:t>3) f_get_flow_usgs_11455420.R</a:t>
+            </a:r>
+          </a:p>
+          <a:p>
+            <a:pPr algn="ctr"/>
+            <a:r>
+              <a:rPr lang="en-US" sz="1200" dirty="0"/>
+              <a:t>4) </a:t>
             </a:r>
             <a:r>
               <a:rPr lang="en-US" sz="1200" dirty="0" err="1"/>
@@ -4643,7 +4690,7 @@
         </p:nvSpPr>
         <p:spPr>
           <a:xfrm>
-            <a:off x="3397530" y="8373785"/>
+            <a:off x="3397530" y="7314243"/>
             <a:ext cx="1884235" cy="709126"/>
           </a:xfrm>
           <a:prstGeom prst="rect">
@@ -4693,7 +4740,7 @@
         </p:nvSpPr>
         <p:spPr>
           <a:xfrm>
-            <a:off x="11334345" y="7048500"/>
+            <a:off x="11334345" y="5988958"/>
             <a:ext cx="2633273" cy="828396"/>
           </a:xfrm>
           <a:prstGeom prst="roundRect">
@@ -4739,7 +4786,7 @@
                   <a:schemeClr val="tx1"/>
                 </a:solidFill>
               </a:rPr>
-              <a:t>raw_chla_usgs_cawsc.csv</a:t>
+              <a:t>raw_chla_nuts_usgs_cawsc.csv</a:t>
             </a:r>
           </a:p>
           <a:p>
@@ -4760,12 +4807,20 @@
               <a:buAutoNum type="arabicParenR"/>
             </a:pPr>
             <a:r>
+              <a:rPr lang="en-US" sz="1200" dirty="0" err="1">
+                <a:solidFill>
+                  <a:schemeClr val="tx1"/>
+                </a:solidFill>
+              </a:rPr>
+              <a:t>discretewq</a:t>
+            </a:r>
+            <a:r>
               <a:rPr lang="en-US" sz="1200" dirty="0">
                 <a:solidFill>
                   <a:schemeClr val="tx1"/>
                 </a:solidFill>
               </a:rPr>
-              <a:t>raw_integrated_wq_incl_nuts.csv</a:t>
+              <a:t> package</a:t>
             </a:r>
           </a:p>
         </p:txBody>
@@ -4788,7 +4843,7 @@
         </p:nvCxnSpPr>
         <p:spPr>
           <a:xfrm>
-            <a:off x="4339648" y="6204599"/>
+            <a:off x="4339648" y="5145057"/>
             <a:ext cx="0" cy="653401"/>
           </a:xfrm>
           <a:prstGeom prst="straightConnector1">
@@ -4823,15 +4878,16 @@
             </a:extLst>
           </p:cNvPr>
           <p:cNvCxnSpPr>
+            <a:cxnSpLocks/>
             <a:stCxn id="25" idx="2"/>
             <a:endCxn id="23" idx="0"/>
           </p:cNvCxnSpPr>
           <p:nvPr/>
         </p:nvCxnSpPr>
         <p:spPr>
-          <a:xfrm flipH="1">
-            <a:off x="7203677" y="6011614"/>
-            <a:ext cx="1" cy="1036886"/>
+          <a:xfrm>
+            <a:off x="7203678" y="5142570"/>
+            <a:ext cx="0" cy="668728"/>
           </a:xfrm>
           <a:prstGeom prst="straightConnector1">
             <a:avLst/>
@@ -4872,7 +4928,7 @@
         </p:nvCxnSpPr>
         <p:spPr>
           <a:xfrm>
-            <a:off x="9835099" y="9067059"/>
+            <a:off x="9835099" y="8007517"/>
             <a:ext cx="0" cy="652076"/>
           </a:xfrm>
           <a:prstGeom prst="straightConnector1">
@@ -4915,7 +4971,7 @@
         </p:nvCxnSpPr>
         <p:spPr>
           <a:xfrm>
-            <a:off x="12650982" y="7876896"/>
+            <a:off x="12650982" y="6817354"/>
             <a:ext cx="1" cy="449388"/>
           </a:xfrm>
           <a:prstGeom prst="straightConnector1">
@@ -4958,7 +5014,7 @@
         </p:nvCxnSpPr>
         <p:spPr>
           <a:xfrm>
-            <a:off x="12650983" y="9082911"/>
+            <a:off x="12650983" y="8023369"/>
             <a:ext cx="0" cy="616707"/>
           </a:xfrm>
           <a:prstGeom prst="straightConnector1">
@@ -5000,9 +5056,9 @@
           <p:nvPr/>
         </p:nvCxnSpPr>
         <p:spPr>
-          <a:xfrm flipH="1">
-            <a:off x="7203676" y="9069617"/>
-            <a:ext cx="2" cy="672631"/>
+          <a:xfrm>
+            <a:off x="7203678" y="8163592"/>
+            <a:ext cx="5958" cy="519114"/>
           </a:xfrm>
           <a:prstGeom prst="straightConnector1">
             <a:avLst/>
@@ -5043,7 +5099,7 @@
         </p:nvCxnSpPr>
         <p:spPr>
           <a:xfrm>
-            <a:off x="4339648" y="7876896"/>
+            <a:off x="4339648" y="6817354"/>
             <a:ext cx="0" cy="496889"/>
           </a:xfrm>
           <a:prstGeom prst="straightConnector1">
@@ -5085,7 +5141,7 @@
         </p:nvCxnSpPr>
         <p:spPr>
           <a:xfrm flipH="1">
-            <a:off x="4339647" y="9082911"/>
+            <a:off x="4339647" y="8023369"/>
             <a:ext cx="1" cy="616708"/>
           </a:xfrm>
           <a:prstGeom prst="straightConnector1">
@@ -5128,8 +5184,8 @@
         </p:nvCxnSpPr>
         <p:spPr>
           <a:xfrm>
-            <a:off x="7203677" y="7876896"/>
-            <a:ext cx="1" cy="216454"/>
+            <a:off x="7203678" y="6830194"/>
+            <a:ext cx="0" cy="203614"/>
           </a:xfrm>
           <a:prstGeom prst="straightConnector1">
             <a:avLst/>
@@ -5167,7 +5223,7 @@
         </p:nvSpPr>
         <p:spPr>
           <a:xfrm>
-            <a:off x="4557329" y="2928364"/>
+            <a:off x="5486547" y="524269"/>
             <a:ext cx="7805416" cy="584775"/>
           </a:xfrm>
           <a:prstGeom prst="rect">
@@ -5182,7 +5238,7 @@
           <a:lstStyle/>
           <a:p>
             <a:r>
-              <a:rPr lang="en-US" sz="3200" b="1" dirty="0">
+              <a:rPr lang="en-US" sz="3200" dirty="0">
                 <a:solidFill>
                   <a:srgbClr val="00B050"/>
                 </a:solidFill>
@@ -5192,6 +5248,802 @@
           </a:p>
         </p:txBody>
       </p:sp>
+      <p:sp>
+        <p:nvSpPr>
+          <p:cNvPr id="3" name="TextBox 2">
+            <a:extLst>
+              <a:ext uri="{FF2B5EF4-FFF2-40B4-BE49-F238E27FC236}">
+                <a16:creationId xmlns:a16="http://schemas.microsoft.com/office/drawing/2014/main" id="{70423B5C-503E-4DA9-A77F-FD94AEEF698C}"/>
+              </a:ext>
+            </a:extLst>
+          </p:cNvPr>
+          <p:cNvSpPr txBox="1"/>
+          <p:nvPr/>
+        </p:nvSpPr>
+        <p:spPr>
+          <a:xfrm>
+            <a:off x="299946" y="2361632"/>
+            <a:ext cx="2031133" cy="369332"/>
+          </a:xfrm>
+          <a:prstGeom prst="rect">
+            <a:avLst/>
+          </a:prstGeom>
+          <a:noFill/>
+        </p:spPr>
+        <p:txBody>
+          <a:bodyPr wrap="none" rtlCol="0">
+            <a:spAutoFit/>
+          </a:bodyPr>
+          <a:lstStyle/>
+          <a:p>
+            <a:r>
+              <a:rPr lang="en-US" b="1" dirty="0"/>
+              <a:t>Water temperature</a:t>
+            </a:r>
+          </a:p>
+        </p:txBody>
+      </p:sp>
+      <p:sp>
+        <p:nvSpPr>
+          <p:cNvPr id="30" name="TextBox 29">
+            <a:extLst>
+              <a:ext uri="{FF2B5EF4-FFF2-40B4-BE49-F238E27FC236}">
+                <a16:creationId xmlns:a16="http://schemas.microsoft.com/office/drawing/2014/main" id="{F64DE808-F36E-48A7-8B4A-ED8695E620FE}"/>
+              </a:ext>
+            </a:extLst>
+          </p:cNvPr>
+          <p:cNvSpPr txBox="1"/>
+          <p:nvPr/>
+        </p:nvSpPr>
+        <p:spPr>
+          <a:xfrm>
+            <a:off x="3464758" y="2254631"/>
+            <a:ext cx="1720599" cy="923330"/>
+          </a:xfrm>
+          <a:prstGeom prst="rect">
+            <a:avLst/>
+          </a:prstGeom>
+          <a:noFill/>
+        </p:spPr>
+        <p:txBody>
+          <a:bodyPr wrap="none" rtlCol="0">
+            <a:spAutoFit/>
+          </a:bodyPr>
+          <a:lstStyle/>
+          <a:p>
+            <a:pPr algn="ctr"/>
+            <a:r>
+              <a:rPr lang="en-US" b="1" dirty="0"/>
+              <a:t>Solar radiation, </a:t>
+            </a:r>
+            <a:br>
+              <a:rPr lang="en-US" b="1" dirty="0"/>
+            </a:br>
+            <a:r>
+              <a:rPr lang="en-US" b="1" dirty="0"/>
+              <a:t>Precipitation, </a:t>
+            </a:r>
+            <a:br>
+              <a:rPr lang="en-US" b="1" dirty="0"/>
+            </a:br>
+            <a:r>
+              <a:rPr lang="en-US" b="1" dirty="0"/>
+              <a:t>Air temperature</a:t>
+            </a:r>
+          </a:p>
+        </p:txBody>
+      </p:sp>
+      <p:sp>
+        <p:nvSpPr>
+          <p:cNvPr id="31" name="TextBox 30">
+            <a:extLst>
+              <a:ext uri="{FF2B5EF4-FFF2-40B4-BE49-F238E27FC236}">
+                <a16:creationId xmlns:a16="http://schemas.microsoft.com/office/drawing/2014/main" id="{B9866D96-CC0D-4E70-865F-235201BD7418}"/>
+              </a:ext>
+            </a:extLst>
+          </p:cNvPr>
+          <p:cNvSpPr txBox="1"/>
+          <p:nvPr/>
+        </p:nvSpPr>
+        <p:spPr>
+          <a:xfrm>
+            <a:off x="6851990" y="2384051"/>
+            <a:ext cx="749731" cy="646331"/>
+          </a:xfrm>
+          <a:prstGeom prst="rect">
+            <a:avLst/>
+          </a:prstGeom>
+          <a:noFill/>
+        </p:spPr>
+        <p:txBody>
+          <a:bodyPr wrap="square" rtlCol="0">
+            <a:spAutoFit/>
+          </a:bodyPr>
+          <a:lstStyle/>
+          <a:p>
+            <a:r>
+              <a:rPr lang="en-US" b="1" dirty="0"/>
+              <a:t>Flow, Tides</a:t>
+            </a:r>
+          </a:p>
+        </p:txBody>
+      </p:sp>
+      <p:sp>
+        <p:nvSpPr>
+          <p:cNvPr id="32" name="TextBox 31">
+            <a:extLst>
+              <a:ext uri="{FF2B5EF4-FFF2-40B4-BE49-F238E27FC236}">
+                <a16:creationId xmlns:a16="http://schemas.microsoft.com/office/drawing/2014/main" id="{4C5FA8DA-7329-42EC-AD23-BEF1327C7FD7}"/>
+              </a:ext>
+            </a:extLst>
+          </p:cNvPr>
+          <p:cNvSpPr txBox="1"/>
+          <p:nvPr/>
+        </p:nvSpPr>
+        <p:spPr>
+          <a:xfrm>
+            <a:off x="9229259" y="2361632"/>
+            <a:ext cx="1576457" cy="646331"/>
+          </a:xfrm>
+          <a:prstGeom prst="rect">
+            <a:avLst/>
+          </a:prstGeom>
+          <a:noFill/>
+        </p:spPr>
+        <p:txBody>
+          <a:bodyPr wrap="none" rtlCol="0">
+            <a:spAutoFit/>
+          </a:bodyPr>
+          <a:lstStyle/>
+          <a:p>
+            <a:r>
+              <a:rPr lang="en-US" b="1" dirty="0"/>
+              <a:t>Inundation, </a:t>
+            </a:r>
+            <a:br>
+              <a:rPr lang="en-US" b="1" dirty="0"/>
+            </a:br>
+            <a:r>
+              <a:rPr lang="en-US" b="1" dirty="0" err="1"/>
+              <a:t>Dayflow</a:t>
+            </a:r>
+            <a:r>
+              <a:rPr lang="en-US" b="1" dirty="0"/>
+              <a:t> (Yolo)</a:t>
+            </a:r>
+          </a:p>
+        </p:txBody>
+      </p:sp>
+      <p:sp>
+        <p:nvSpPr>
+          <p:cNvPr id="34" name="TextBox 33">
+            <a:extLst>
+              <a:ext uri="{FF2B5EF4-FFF2-40B4-BE49-F238E27FC236}">
+                <a16:creationId xmlns:a16="http://schemas.microsoft.com/office/drawing/2014/main" id="{6302A601-4BD1-47BB-B26A-FCA8E7EBE668}"/>
+              </a:ext>
+            </a:extLst>
+          </p:cNvPr>
+          <p:cNvSpPr txBox="1"/>
+          <p:nvPr/>
+        </p:nvSpPr>
+        <p:spPr>
+          <a:xfrm>
+            <a:off x="12055939" y="2361632"/>
+            <a:ext cx="1335045" cy="646331"/>
+          </a:xfrm>
+          <a:prstGeom prst="rect">
+            <a:avLst/>
+          </a:prstGeom>
+          <a:noFill/>
+        </p:spPr>
+        <p:txBody>
+          <a:bodyPr wrap="none" rtlCol="0">
+            <a:spAutoFit/>
+          </a:bodyPr>
+          <a:lstStyle/>
+          <a:p>
+            <a:pPr algn="ctr"/>
+            <a:r>
+              <a:rPr lang="en-US" b="1" dirty="0"/>
+              <a:t>Chlorophyll,</a:t>
+            </a:r>
+            <a:br>
+              <a:rPr lang="en-US" b="1" dirty="0"/>
+            </a:br>
+            <a:r>
+              <a:rPr lang="en-US" b="1" dirty="0"/>
+              <a:t>Nutrients</a:t>
+            </a:r>
+          </a:p>
+        </p:txBody>
+      </p:sp>
+      <p:cxnSp>
+        <p:nvCxnSpPr>
+          <p:cNvPr id="7" name="Straight Connector 6">
+            <a:extLst>
+              <a:ext uri="{FF2B5EF4-FFF2-40B4-BE49-F238E27FC236}">
+                <a16:creationId xmlns:a16="http://schemas.microsoft.com/office/drawing/2014/main" id="{E961A9C3-F1CC-43C9-A7EF-800C6598BF80}"/>
+              </a:ext>
+            </a:extLst>
+          </p:cNvPr>
+          <p:cNvCxnSpPr/>
+          <p:nvPr/>
+        </p:nvCxnSpPr>
+        <p:spPr>
+          <a:xfrm>
+            <a:off x="-1" y="2167596"/>
+            <a:ext cx="14265275" cy="0"/>
+          </a:xfrm>
+          <a:prstGeom prst="line">
+            <a:avLst/>
+          </a:prstGeom>
+          <a:ln w="19050">
+            <a:prstDash val="dash"/>
+          </a:ln>
+        </p:spPr>
+        <p:style>
+          <a:lnRef idx="1">
+            <a:schemeClr val="accent1"/>
+          </a:lnRef>
+          <a:fillRef idx="0">
+            <a:schemeClr val="accent1"/>
+          </a:fillRef>
+          <a:effectRef idx="0">
+            <a:schemeClr val="accent1"/>
+          </a:effectRef>
+          <a:fontRef idx="minor">
+            <a:schemeClr val="tx1"/>
+          </a:fontRef>
+        </p:style>
+      </p:cxnSp>
+      <p:cxnSp>
+        <p:nvCxnSpPr>
+          <p:cNvPr id="35" name="Straight Connector 34">
+            <a:extLst>
+              <a:ext uri="{FF2B5EF4-FFF2-40B4-BE49-F238E27FC236}">
+                <a16:creationId xmlns:a16="http://schemas.microsoft.com/office/drawing/2014/main" id="{F787D7BF-A712-4FCB-A81F-7C7710CB401F}"/>
+              </a:ext>
+            </a:extLst>
+          </p:cNvPr>
+          <p:cNvCxnSpPr/>
+          <p:nvPr/>
+        </p:nvCxnSpPr>
+        <p:spPr>
+          <a:xfrm>
+            <a:off x="15630" y="3272496"/>
+            <a:ext cx="14265275" cy="0"/>
+          </a:xfrm>
+          <a:prstGeom prst="line">
+            <a:avLst/>
+          </a:prstGeom>
+          <a:ln w="19050">
+            <a:prstDash val="dash"/>
+          </a:ln>
+        </p:spPr>
+        <p:style>
+          <a:lnRef idx="1">
+            <a:schemeClr val="accent1"/>
+          </a:lnRef>
+          <a:fillRef idx="0">
+            <a:schemeClr val="accent1"/>
+          </a:fillRef>
+          <a:effectRef idx="0">
+            <a:schemeClr val="accent1"/>
+          </a:effectRef>
+          <a:fontRef idx="minor">
+            <a:schemeClr val="tx1"/>
+          </a:fontRef>
+        </p:style>
+      </p:cxnSp>
+      <p:sp>
+        <p:nvSpPr>
+          <p:cNvPr id="41" name="Rectangle 40">
+            <a:extLst>
+              <a:ext uri="{FF2B5EF4-FFF2-40B4-BE49-F238E27FC236}">
+                <a16:creationId xmlns:a16="http://schemas.microsoft.com/office/drawing/2014/main" id="{1C4C5D62-E3CB-4AB4-9774-F4FA3BE96ED1}"/>
+              </a:ext>
+            </a:extLst>
+          </p:cNvPr>
+          <p:cNvSpPr/>
+          <p:nvPr/>
+        </p:nvSpPr>
+        <p:spPr>
+          <a:xfrm>
+            <a:off x="5947319" y="10187458"/>
+            <a:ext cx="2512718" cy="639924"/>
+          </a:xfrm>
+          <a:prstGeom prst="rect">
+            <a:avLst/>
+          </a:prstGeom>
+          <a:solidFill>
+            <a:schemeClr val="accent4">
+              <a:lumMod val="40000"/>
+              <a:lumOff val="60000"/>
+            </a:schemeClr>
+          </a:solidFill>
+        </p:spPr>
+        <p:style>
+          <a:lnRef idx="2">
+            <a:schemeClr val="accent1">
+              <a:shade val="50000"/>
+            </a:schemeClr>
+          </a:lnRef>
+          <a:fillRef idx="1">
+            <a:schemeClr val="accent1"/>
+          </a:fillRef>
+          <a:effectRef idx="0">
+            <a:schemeClr val="accent1"/>
+          </a:effectRef>
+          <a:fontRef idx="minor">
+            <a:schemeClr val="lt1"/>
+          </a:fontRef>
+        </p:style>
+        <p:txBody>
+          <a:bodyPr rtlCol="0" anchor="ctr"/>
+          <a:lstStyle/>
+          <a:p>
+            <a:r>
+              <a:rPr lang="en-US" sz="1200" dirty="0">
+                <a:solidFill>
+                  <a:schemeClr val="tx1"/>
+                </a:solidFill>
+              </a:rPr>
+              <a:t>1) Can’t find what makes the clean_lib_model_flow.csv file. Liz?</a:t>
+            </a:r>
+          </a:p>
+          <a:p>
+            <a:r>
+              <a:rPr lang="en-US" sz="1200" dirty="0">
+                <a:solidFill>
+                  <a:schemeClr val="tx1"/>
+                </a:solidFill>
+              </a:rPr>
+              <a:t>2) f_load_flow_tides_11455420.R</a:t>
+            </a:r>
+          </a:p>
+        </p:txBody>
+      </p:sp>
+      <p:sp>
+        <p:nvSpPr>
+          <p:cNvPr id="43" name="Rectangle: Rounded Corners 42">
+            <a:extLst>
+              <a:ext uri="{FF2B5EF4-FFF2-40B4-BE49-F238E27FC236}">
+                <a16:creationId xmlns:a16="http://schemas.microsoft.com/office/drawing/2014/main" id="{C6662523-6861-404F-A315-EEBE7DD87B40}"/>
+              </a:ext>
+            </a:extLst>
+          </p:cNvPr>
+          <p:cNvSpPr/>
+          <p:nvPr/>
+        </p:nvSpPr>
+        <p:spPr>
+          <a:xfrm>
+            <a:off x="5849099" y="11313727"/>
+            <a:ext cx="2755511" cy="639925"/>
+          </a:xfrm>
+          <a:prstGeom prst="roundRect">
+            <a:avLst/>
+          </a:prstGeom>
+          <a:solidFill>
+            <a:schemeClr val="bg2"/>
+          </a:solidFill>
+          <a:ln>
+            <a:solidFill>
+              <a:schemeClr val="bg2">
+                <a:lumMod val="50000"/>
+              </a:schemeClr>
+            </a:solidFill>
+          </a:ln>
+        </p:spPr>
+        <p:style>
+          <a:lnRef idx="2">
+            <a:schemeClr val="accent1">
+              <a:shade val="50000"/>
+            </a:schemeClr>
+          </a:lnRef>
+          <a:fillRef idx="1">
+            <a:schemeClr val="accent1"/>
+          </a:fillRef>
+          <a:effectRef idx="0">
+            <a:schemeClr val="accent1"/>
+          </a:effectRef>
+          <a:fontRef idx="minor">
+            <a:schemeClr val="lt1"/>
+          </a:fontRef>
+        </p:style>
+        <p:txBody>
+          <a:bodyPr rtlCol="0" anchor="ctr"/>
+          <a:lstStyle/>
+          <a:p>
+            <a:r>
+              <a:rPr lang="en-US" sz="1200" dirty="0">
+                <a:solidFill>
+                  <a:schemeClr val="tx1"/>
+                </a:solidFill>
+              </a:rPr>
+              <a:t>1) clean_ lib_model_flow.csv</a:t>
+            </a:r>
+          </a:p>
+          <a:p>
+            <a:r>
+              <a:rPr lang="en-US" sz="1200" dirty="0">
+                <a:solidFill>
+                  <a:schemeClr val="tx1"/>
+                </a:solidFill>
+              </a:rPr>
+              <a:t>2) clean_flow_tides_usgs_11455420.csv</a:t>
+            </a:r>
+          </a:p>
+          <a:p>
+            <a:endParaRPr lang="en-US" sz="1200" dirty="0">
+              <a:solidFill>
+                <a:schemeClr val="tx1"/>
+              </a:solidFill>
+            </a:endParaRPr>
+          </a:p>
+        </p:txBody>
+      </p:sp>
+      <p:sp>
+        <p:nvSpPr>
+          <p:cNvPr id="48" name="Rectangle: Rounded Corners 47">
+            <a:extLst>
+              <a:ext uri="{FF2B5EF4-FFF2-40B4-BE49-F238E27FC236}">
+                <a16:creationId xmlns:a16="http://schemas.microsoft.com/office/drawing/2014/main" id="{8AFDB5B5-3F67-4B2B-96CD-ADBBE3EE8525}"/>
+              </a:ext>
+            </a:extLst>
+          </p:cNvPr>
+          <p:cNvSpPr/>
+          <p:nvPr/>
+        </p:nvSpPr>
+        <p:spPr>
+          <a:xfrm>
+            <a:off x="8796548" y="5811298"/>
+            <a:ext cx="2057873" cy="1018896"/>
+          </a:xfrm>
+          <a:prstGeom prst="roundRect">
+            <a:avLst/>
+          </a:prstGeom>
+          <a:solidFill>
+            <a:schemeClr val="accent4">
+              <a:lumMod val="40000"/>
+              <a:lumOff val="60000"/>
+            </a:schemeClr>
+          </a:solidFill>
+          <a:ln>
+            <a:solidFill>
+              <a:schemeClr val="bg2">
+                <a:lumMod val="50000"/>
+              </a:schemeClr>
+            </a:solidFill>
+          </a:ln>
+        </p:spPr>
+        <p:style>
+          <a:lnRef idx="2">
+            <a:schemeClr val="accent1">
+              <a:shade val="50000"/>
+            </a:schemeClr>
+          </a:lnRef>
+          <a:fillRef idx="1">
+            <a:schemeClr val="accent1"/>
+          </a:fillRef>
+          <a:effectRef idx="0">
+            <a:schemeClr val="accent1"/>
+          </a:effectRef>
+          <a:fontRef idx="minor">
+            <a:schemeClr val="lt1"/>
+          </a:fontRef>
+        </p:style>
+        <p:txBody>
+          <a:bodyPr rtlCol="0" anchor="ctr"/>
+          <a:lstStyle/>
+          <a:p>
+            <a:r>
+              <a:rPr lang="en-US" sz="1200" dirty="0">
+                <a:solidFill>
+                  <a:schemeClr val="tx1"/>
+                </a:solidFill>
+              </a:rPr>
+              <a:t>Pascale to fill this workflow out</a:t>
+            </a:r>
+          </a:p>
+        </p:txBody>
+      </p:sp>
+      <p:sp>
+        <p:nvSpPr>
+          <p:cNvPr id="49" name="Rectangle: Rounded Corners 48">
+            <a:extLst>
+              <a:ext uri="{FF2B5EF4-FFF2-40B4-BE49-F238E27FC236}">
+                <a16:creationId xmlns:a16="http://schemas.microsoft.com/office/drawing/2014/main" id="{87DA1F61-FE16-4565-BC34-5253B56670B0}"/>
+              </a:ext>
+            </a:extLst>
+          </p:cNvPr>
+          <p:cNvSpPr/>
+          <p:nvPr/>
+        </p:nvSpPr>
+        <p:spPr>
+          <a:xfrm>
+            <a:off x="240199" y="5668079"/>
+            <a:ext cx="2057873" cy="1018896"/>
+          </a:xfrm>
+          <a:prstGeom prst="roundRect">
+            <a:avLst/>
+          </a:prstGeom>
+          <a:solidFill>
+            <a:schemeClr val="accent4">
+              <a:lumMod val="40000"/>
+              <a:lumOff val="60000"/>
+            </a:schemeClr>
+          </a:solidFill>
+          <a:ln>
+            <a:solidFill>
+              <a:schemeClr val="bg2">
+                <a:lumMod val="50000"/>
+              </a:schemeClr>
+            </a:solidFill>
+          </a:ln>
+        </p:spPr>
+        <p:style>
+          <a:lnRef idx="2">
+            <a:schemeClr val="accent1">
+              <a:shade val="50000"/>
+            </a:schemeClr>
+          </a:lnRef>
+          <a:fillRef idx="1">
+            <a:schemeClr val="accent1"/>
+          </a:fillRef>
+          <a:effectRef idx="0">
+            <a:schemeClr val="accent1"/>
+          </a:effectRef>
+          <a:fontRef idx="minor">
+            <a:schemeClr val="lt1"/>
+          </a:fontRef>
+        </p:style>
+        <p:txBody>
+          <a:bodyPr rtlCol="0" anchor="ctr"/>
+          <a:lstStyle/>
+          <a:p>
+            <a:r>
+              <a:rPr lang="en-US" sz="1200" dirty="0">
+                <a:solidFill>
+                  <a:schemeClr val="tx1"/>
+                </a:solidFill>
+              </a:rPr>
+              <a:t>Pascale to fill this workflow out</a:t>
+            </a:r>
+          </a:p>
+        </p:txBody>
+      </p:sp>
+      <p:sp>
+        <p:nvSpPr>
+          <p:cNvPr id="50" name="Rectangle 49">
+            <a:extLst>
+              <a:ext uri="{FF2B5EF4-FFF2-40B4-BE49-F238E27FC236}">
+                <a16:creationId xmlns:a16="http://schemas.microsoft.com/office/drawing/2014/main" id="{BCEDC81B-3322-4A09-A403-5CFFEE1BC488}"/>
+              </a:ext>
+            </a:extLst>
+          </p:cNvPr>
+          <p:cNvSpPr/>
+          <p:nvPr/>
+        </p:nvSpPr>
+        <p:spPr>
+          <a:xfrm>
+            <a:off x="11334345" y="4605340"/>
+            <a:ext cx="2633273" cy="492094"/>
+          </a:xfrm>
+          <a:prstGeom prst="rect">
+            <a:avLst/>
+          </a:prstGeom>
+        </p:spPr>
+        <p:style>
+          <a:lnRef idx="2">
+            <a:schemeClr val="accent1">
+              <a:shade val="50000"/>
+            </a:schemeClr>
+          </a:lnRef>
+          <a:fillRef idx="1">
+            <a:schemeClr val="accent1"/>
+          </a:fillRef>
+          <a:effectRef idx="0">
+            <a:schemeClr val="accent1"/>
+          </a:effectRef>
+          <a:fontRef idx="minor">
+            <a:schemeClr val="lt1"/>
+          </a:fontRef>
+        </p:style>
+        <p:txBody>
+          <a:bodyPr rtlCol="0" anchor="ctr"/>
+          <a:lstStyle/>
+          <a:p>
+            <a:pPr marL="228600" indent="-228600">
+              <a:buAutoNum type="arabicParenR"/>
+            </a:pPr>
+            <a:r>
+              <a:rPr lang="en-US" sz="1200" dirty="0" err="1"/>
+              <a:t>f_get_usgs_cawsc_chla_nuts.R</a:t>
+            </a:r>
+            <a:endParaRPr lang="en-US" sz="1200" dirty="0"/>
+          </a:p>
+          <a:p>
+            <a:pPr marL="228600" indent="-228600">
+              <a:buAutoNum type="arabicParenR"/>
+            </a:pPr>
+            <a:r>
+              <a:rPr lang="en-US" sz="1200" dirty="0"/>
+              <a:t>Manually added</a:t>
+            </a:r>
+          </a:p>
+        </p:txBody>
+      </p:sp>
+      <p:cxnSp>
+        <p:nvCxnSpPr>
+          <p:cNvPr id="52" name="Straight Arrow Connector 51">
+            <a:extLst>
+              <a:ext uri="{FF2B5EF4-FFF2-40B4-BE49-F238E27FC236}">
+                <a16:creationId xmlns:a16="http://schemas.microsoft.com/office/drawing/2014/main" id="{B6B1E027-A09A-463F-B8CA-352D067C6EB5}"/>
+              </a:ext>
+            </a:extLst>
+          </p:cNvPr>
+          <p:cNvCxnSpPr>
+            <a:cxnSpLocks/>
+            <a:stCxn id="50" idx="2"/>
+            <a:endCxn id="27" idx="0"/>
+          </p:cNvCxnSpPr>
+          <p:nvPr/>
+        </p:nvCxnSpPr>
+        <p:spPr>
+          <a:xfrm>
+            <a:off x="12650982" y="5097434"/>
+            <a:ext cx="0" cy="891524"/>
+          </a:xfrm>
+          <a:prstGeom prst="straightConnector1">
+            <a:avLst/>
+          </a:prstGeom>
+          <a:ln>
+            <a:tailEnd type="triangle"/>
+          </a:ln>
+        </p:spPr>
+        <p:style>
+          <a:lnRef idx="1">
+            <a:schemeClr val="accent1"/>
+          </a:lnRef>
+          <a:fillRef idx="0">
+            <a:schemeClr val="accent1"/>
+          </a:fillRef>
+          <a:effectRef idx="0">
+            <a:schemeClr val="accent1"/>
+          </a:effectRef>
+          <a:fontRef idx="minor">
+            <a:schemeClr val="tx1"/>
+          </a:fontRef>
+        </p:style>
+      </p:cxnSp>
+      <p:cxnSp>
+        <p:nvCxnSpPr>
+          <p:cNvPr id="57" name="Straight Arrow Connector 56">
+            <a:extLst>
+              <a:ext uri="{FF2B5EF4-FFF2-40B4-BE49-F238E27FC236}">
+                <a16:creationId xmlns:a16="http://schemas.microsoft.com/office/drawing/2014/main" id="{FD3C60AF-687F-4B1A-A8B1-7C6593B08B35}"/>
+              </a:ext>
+            </a:extLst>
+          </p:cNvPr>
+          <p:cNvCxnSpPr>
+            <a:cxnSpLocks/>
+            <a:stCxn id="14" idx="2"/>
+            <a:endCxn id="41" idx="0"/>
+          </p:cNvCxnSpPr>
+          <p:nvPr/>
+        </p:nvCxnSpPr>
+        <p:spPr>
+          <a:xfrm flipH="1">
+            <a:off x="7203678" y="9658973"/>
+            <a:ext cx="5958" cy="528485"/>
+          </a:xfrm>
+          <a:prstGeom prst="straightConnector1">
+            <a:avLst/>
+          </a:prstGeom>
+          <a:ln>
+            <a:tailEnd type="triangle"/>
+          </a:ln>
+        </p:spPr>
+        <p:style>
+          <a:lnRef idx="1">
+            <a:schemeClr val="accent1"/>
+          </a:lnRef>
+          <a:fillRef idx="0">
+            <a:schemeClr val="accent1"/>
+          </a:fillRef>
+          <a:effectRef idx="0">
+            <a:schemeClr val="accent1"/>
+          </a:effectRef>
+          <a:fontRef idx="minor">
+            <a:schemeClr val="tx1"/>
+          </a:fontRef>
+        </p:style>
+      </p:cxnSp>
+      <p:cxnSp>
+        <p:nvCxnSpPr>
+          <p:cNvPr id="60" name="Straight Arrow Connector 59">
+            <a:extLst>
+              <a:ext uri="{FF2B5EF4-FFF2-40B4-BE49-F238E27FC236}">
+                <a16:creationId xmlns:a16="http://schemas.microsoft.com/office/drawing/2014/main" id="{36B0BC84-9830-4AD1-A99E-4824566DED46}"/>
+              </a:ext>
+            </a:extLst>
+          </p:cNvPr>
+          <p:cNvCxnSpPr>
+            <a:stCxn id="41" idx="2"/>
+            <a:endCxn id="41" idx="2"/>
+          </p:cNvCxnSpPr>
+          <p:nvPr/>
+        </p:nvCxnSpPr>
+        <p:spPr>
+          <a:xfrm>
+            <a:off x="7203678" y="10827382"/>
+            <a:ext cx="0" cy="0"/>
+          </a:xfrm>
+          <a:prstGeom prst="straightConnector1">
+            <a:avLst/>
+          </a:prstGeom>
+          <a:ln>
+            <a:tailEnd type="triangle"/>
+          </a:ln>
+        </p:spPr>
+        <p:style>
+          <a:lnRef idx="1">
+            <a:schemeClr val="accent1"/>
+          </a:lnRef>
+          <a:fillRef idx="0">
+            <a:schemeClr val="accent1"/>
+          </a:fillRef>
+          <a:effectRef idx="0">
+            <a:schemeClr val="accent1"/>
+          </a:effectRef>
+          <a:fontRef idx="minor">
+            <a:schemeClr val="tx1"/>
+          </a:fontRef>
+        </p:style>
+      </p:cxnSp>
+      <p:cxnSp>
+        <p:nvCxnSpPr>
+          <p:cNvPr id="62" name="Straight Arrow Connector 61">
+            <a:extLst>
+              <a:ext uri="{FF2B5EF4-FFF2-40B4-BE49-F238E27FC236}">
+                <a16:creationId xmlns:a16="http://schemas.microsoft.com/office/drawing/2014/main" id="{50161850-E365-4BC7-B00E-E40703C9A708}"/>
+              </a:ext>
+            </a:extLst>
+          </p:cNvPr>
+          <p:cNvCxnSpPr>
+            <a:cxnSpLocks/>
+            <a:stCxn id="41" idx="2"/>
+            <a:endCxn id="43" idx="0"/>
+          </p:cNvCxnSpPr>
+          <p:nvPr/>
+        </p:nvCxnSpPr>
+        <p:spPr>
+          <a:xfrm>
+            <a:off x="7203678" y="10827382"/>
+            <a:ext cx="23177" cy="486345"/>
+          </a:xfrm>
+          <a:prstGeom prst="straightConnector1">
+            <a:avLst/>
+          </a:prstGeom>
+          <a:ln>
+            <a:tailEnd type="triangle"/>
+          </a:ln>
+        </p:spPr>
+        <p:style>
+          <a:lnRef idx="1">
+            <a:schemeClr val="accent1"/>
+          </a:lnRef>
+          <a:fillRef idx="0">
+            <a:schemeClr val="accent1"/>
+          </a:fillRef>
+          <a:effectRef idx="0">
+            <a:schemeClr val="accent1"/>
+          </a:effectRef>
+          <a:fontRef idx="minor">
+            <a:schemeClr val="tx1"/>
+          </a:fontRef>
+        </p:style>
+      </p:cxnSp>
     </p:spTree>
     <p:extLst>
       <p:ext uri="{BB962C8B-B14F-4D97-AF65-F5344CB8AC3E}">
@@ -5236,7 +6088,7 @@
         </p:nvSpPr>
         <p:spPr>
           <a:xfrm>
-            <a:off x="6116076" y="12069716"/>
+            <a:off x="6116076" y="10313489"/>
             <a:ext cx="1302092" cy="709126"/>
           </a:xfrm>
           <a:prstGeom prst="rect">
@@ -5286,7 +6138,7 @@
         </p:nvSpPr>
         <p:spPr>
           <a:xfrm>
-            <a:off x="8893543" y="9792827"/>
+            <a:off x="9991870" y="8001531"/>
             <a:ext cx="1302092" cy="709126"/>
           </a:xfrm>
           <a:prstGeom prst="rect">
@@ -5318,52 +6170,6 @@
               <a:rPr lang="en-US" sz="1200" dirty="0" err="1"/>
               <a:t>f_load_daily_covars_models.R</a:t>
             </a:r>
-            <a:endParaRPr lang="en-US" sz="1200" dirty="0"/>
-          </a:p>
-        </p:txBody>
-      </p:sp>
-      <p:sp>
-        <p:nvSpPr>
-          <p:cNvPr id="9" name="Rectangle 8">
-            <a:extLst>
-              <a:ext uri="{FF2B5EF4-FFF2-40B4-BE49-F238E27FC236}">
-                <a16:creationId xmlns:a16="http://schemas.microsoft.com/office/drawing/2014/main" id="{74AD3FDF-ACB0-48C0-B89A-946F5DB02AB6}"/>
-              </a:ext>
-            </a:extLst>
-          </p:cNvPr>
-          <p:cNvSpPr/>
-          <p:nvPr/>
-        </p:nvSpPr>
-        <p:spPr>
-          <a:xfrm>
-            <a:off x="6103695" y="9795181"/>
-            <a:ext cx="1302092" cy="709126"/>
-          </a:xfrm>
-          <a:prstGeom prst="rect">
-            <a:avLst/>
-          </a:prstGeom>
-        </p:spPr>
-        <p:style>
-          <a:lnRef idx="2">
-            <a:schemeClr val="accent1">
-              <a:shade val="50000"/>
-            </a:schemeClr>
-          </a:lnRef>
-          <a:fillRef idx="1">
-            <a:schemeClr val="accent1"/>
-          </a:fillRef>
-          <a:effectRef idx="0">
-            <a:schemeClr val="accent1"/>
-          </a:effectRef>
-          <a:fontRef idx="minor">
-            <a:schemeClr val="lt1"/>
-          </a:fontRef>
-        </p:style>
-        <p:txBody>
-          <a:bodyPr rtlCol="0" anchor="ctr"/>
-          <a:lstStyle/>
-          <a:p>
-            <a:pPr algn="ctr"/>
             <a:endParaRPr lang="en-US" sz="1200" dirty="0"/>
           </a:p>
         </p:txBody>
@@ -5382,8 +6188,8 @@
         </p:nvSpPr>
         <p:spPr>
           <a:xfrm>
-            <a:off x="3218980" y="9680240"/>
-            <a:ext cx="1302092" cy="709126"/>
+            <a:off x="2669308" y="7939365"/>
+            <a:ext cx="2401434" cy="709126"/>
           </a:xfrm>
           <a:prstGeom prst="rect">
             <a:avLst/>
@@ -5436,8 +6242,8 @@
         </p:nvCxnSpPr>
         <p:spPr>
           <a:xfrm>
-            <a:off x="3870026" y="10389366"/>
-            <a:ext cx="0" cy="691686"/>
+            <a:off x="3870025" y="8648491"/>
+            <a:ext cx="1" cy="676334"/>
           </a:xfrm>
           <a:prstGeom prst="straightConnector1">
             <a:avLst/>
@@ -5472,15 +6278,14 @@
           </p:cNvPr>
           <p:cNvCxnSpPr>
             <a:cxnSpLocks/>
-            <a:stCxn id="9" idx="2"/>
             <a:endCxn id="32" idx="0"/>
           </p:cNvCxnSpPr>
           <p:nvPr/>
         </p:nvCxnSpPr>
         <p:spPr>
           <a:xfrm>
-            <a:off x="6754742" y="10504307"/>
-            <a:ext cx="12381" cy="576744"/>
+            <a:off x="7005705" y="8134882"/>
+            <a:ext cx="12380" cy="576745"/>
           </a:xfrm>
           <a:prstGeom prst="straightConnector1">
             <a:avLst/>
@@ -5522,7 +6327,7 @@
         </p:nvCxnSpPr>
         <p:spPr>
           <a:xfrm>
-            <a:off x="9544589" y="10501953"/>
+            <a:off x="10642916" y="8710657"/>
             <a:ext cx="0" cy="579098"/>
           </a:xfrm>
           <a:prstGeom prst="straightConnector1">
@@ -5561,7 +6366,7 @@
         </p:nvSpPr>
         <p:spPr>
           <a:xfrm>
-            <a:off x="7940492" y="5279350"/>
+            <a:off x="9667966" y="3782328"/>
             <a:ext cx="3208193" cy="3369946"/>
           </a:xfrm>
           <a:prstGeom prst="roundRect">
@@ -5841,9 +6646,9 @@
           <p:nvPr/>
         </p:nvCxnSpPr>
         <p:spPr>
-          <a:xfrm>
-            <a:off x="9544589" y="8649297"/>
-            <a:ext cx="1" cy="1143531"/>
+          <a:xfrm flipH="1">
+            <a:off x="10642916" y="7152274"/>
+            <a:ext cx="629147" cy="849257"/>
           </a:xfrm>
           <a:prstGeom prst="straightConnector1">
             <a:avLst/>
@@ -5881,7 +6686,7 @@
         </p:nvSpPr>
         <p:spPr>
           <a:xfrm>
-            <a:off x="8463502" y="11081052"/>
+            <a:off x="9561829" y="9289756"/>
             <a:ext cx="2162175" cy="335369"/>
           </a:xfrm>
           <a:prstGeom prst="roundRect">
@@ -5944,7 +6749,7 @@
         </p:nvSpPr>
         <p:spPr>
           <a:xfrm>
-            <a:off x="5566405" y="11081052"/>
+            <a:off x="5817368" y="8711627"/>
             <a:ext cx="2401434" cy="335369"/>
           </a:xfrm>
           <a:prstGeom prst="roundRect">
@@ -6007,7 +6812,7 @@
         </p:nvSpPr>
         <p:spPr>
           <a:xfrm>
-            <a:off x="2669309" y="11081052"/>
+            <a:off x="2669309" y="9324825"/>
             <a:ext cx="2401434" cy="335369"/>
           </a:xfrm>
           <a:prstGeom prst="roundRect">
@@ -6070,7 +6875,7 @@
         </p:nvSpPr>
         <p:spPr>
           <a:xfrm>
-            <a:off x="6919055" y="13096770"/>
+            <a:off x="6919055" y="11340543"/>
             <a:ext cx="2401434" cy="335369"/>
           </a:xfrm>
           <a:prstGeom prst="roundRect">
@@ -6133,7 +6938,7 @@
         </p:nvSpPr>
         <p:spPr>
           <a:xfrm>
-            <a:off x="4175855" y="13096770"/>
+            <a:off x="4175855" y="11340543"/>
             <a:ext cx="2401434" cy="335369"/>
           </a:xfrm>
           <a:prstGeom prst="roundRect">
@@ -6200,7 +7005,7 @@
         </p:nvCxnSpPr>
         <p:spPr>
           <a:xfrm>
-            <a:off x="3870026" y="11416420"/>
+            <a:off x="3870026" y="9660193"/>
             <a:ext cx="2897096" cy="653296"/>
           </a:xfrm>
           <a:prstGeom prst="straightConnector1">
@@ -6242,8 +7047,8 @@
         </p:nvCxnSpPr>
         <p:spPr>
           <a:xfrm flipH="1">
-            <a:off x="6767123" y="11416420"/>
-            <a:ext cx="2777467" cy="653296"/>
+            <a:off x="6767122" y="9625125"/>
+            <a:ext cx="3875795" cy="688364"/>
           </a:xfrm>
           <a:prstGeom prst="straightConnector1">
             <a:avLst/>
@@ -6277,15 +7082,16 @@
             </a:extLst>
           </p:cNvPr>
           <p:cNvCxnSpPr>
+            <a:cxnSpLocks/>
             <a:stCxn id="32" idx="2"/>
             <a:endCxn id="4" idx="0"/>
           </p:cNvCxnSpPr>
           <p:nvPr/>
         </p:nvCxnSpPr>
         <p:spPr>
-          <a:xfrm>
-            <a:off x="6767122" y="11416420"/>
-            <a:ext cx="0" cy="653296"/>
+          <a:xfrm flipH="1">
+            <a:off x="6767122" y="9046996"/>
+            <a:ext cx="250963" cy="1266493"/>
           </a:xfrm>
           <a:prstGeom prst="straightConnector1">
             <a:avLst/>
@@ -6326,7 +7132,7 @@
         </p:nvCxnSpPr>
         <p:spPr>
           <a:xfrm flipH="1">
-            <a:off x="5376572" y="12778843"/>
+            <a:off x="5376572" y="11022616"/>
             <a:ext cx="1390550" cy="317927"/>
           </a:xfrm>
           <a:prstGeom prst="straightConnector1">
@@ -6369,7 +7175,7 @@
         </p:nvCxnSpPr>
         <p:spPr>
           <a:xfrm>
-            <a:off x="6767122" y="12778843"/>
+            <a:off x="6767122" y="11022616"/>
             <a:ext cx="1352650" cy="317927"/>
           </a:xfrm>
           <a:prstGeom prst="straightConnector1">
@@ -6408,7 +7214,7 @@
         </p:nvSpPr>
         <p:spPr>
           <a:xfrm>
-            <a:off x="2669309" y="6492534"/>
+            <a:off x="2669309" y="4736307"/>
             <a:ext cx="2401434" cy="335369"/>
           </a:xfrm>
           <a:prstGeom prst="roundRect">
@@ -6471,7 +7277,7 @@
         </p:nvSpPr>
         <p:spPr>
           <a:xfrm>
-            <a:off x="1367217" y="7933585"/>
+            <a:off x="1367217" y="6177358"/>
             <a:ext cx="1302092" cy="709126"/>
           </a:xfrm>
           <a:prstGeom prst="rect">
@@ -6521,7 +7327,7 @@
         </p:nvSpPr>
         <p:spPr>
           <a:xfrm>
-            <a:off x="817546" y="8988554"/>
+            <a:off x="817546" y="7232327"/>
             <a:ext cx="2401434" cy="335369"/>
           </a:xfrm>
           <a:prstGeom prst="roundRect">
@@ -6580,6 +7386,7 @@
             </a:extLst>
           </p:cNvPr>
           <p:cNvCxnSpPr>
+            <a:cxnSpLocks/>
             <a:stCxn id="37" idx="2"/>
             <a:endCxn id="11" idx="0"/>
           </p:cNvCxnSpPr>
@@ -6587,8 +7394,8 @@
         </p:nvCxnSpPr>
         <p:spPr>
           <a:xfrm>
-            <a:off x="2018263" y="9323923"/>
-            <a:ext cx="1851763" cy="356317"/>
+            <a:off x="2018263" y="7567696"/>
+            <a:ext cx="1851762" cy="371669"/>
           </a:xfrm>
           <a:prstGeom prst="straightConnector1">
             <a:avLst/>
@@ -6622,15 +7429,16 @@
             </a:extLst>
           </p:cNvPr>
           <p:cNvCxnSpPr>
+            <a:cxnSpLocks/>
             <a:stCxn id="34" idx="2"/>
             <a:endCxn id="11" idx="0"/>
           </p:cNvCxnSpPr>
           <p:nvPr/>
         </p:nvCxnSpPr>
         <p:spPr>
-          <a:xfrm>
-            <a:off x="3870026" y="6827903"/>
-            <a:ext cx="0" cy="2852337"/>
+          <a:xfrm flipH="1">
+            <a:off x="3870025" y="5071676"/>
+            <a:ext cx="1" cy="2867689"/>
           </a:xfrm>
           <a:prstGeom prst="straightConnector1">
             <a:avLst/>
@@ -6671,7 +7479,7 @@
         </p:nvCxnSpPr>
         <p:spPr>
           <a:xfrm>
-            <a:off x="2018263" y="8642711"/>
+            <a:off x="2018263" y="6886484"/>
             <a:ext cx="0" cy="345843"/>
           </a:xfrm>
           <a:prstGeom prst="straightConnector1">
@@ -6713,7 +7521,7 @@
         </p:nvCxnSpPr>
         <p:spPr>
           <a:xfrm flipH="1">
-            <a:off x="2018263" y="6827903"/>
+            <a:off x="2018263" y="5071676"/>
             <a:ext cx="1851763" cy="1105682"/>
           </a:xfrm>
           <a:prstGeom prst="straightConnector1">
@@ -6752,7 +7560,7 @@
         </p:nvSpPr>
         <p:spPr>
           <a:xfrm>
-            <a:off x="3218980" y="5269881"/>
+            <a:off x="3218980" y="3513654"/>
             <a:ext cx="1302092" cy="709126"/>
           </a:xfrm>
           <a:prstGeom prst="rect">
@@ -6805,7 +7613,7 @@
         </p:nvCxnSpPr>
         <p:spPr>
           <a:xfrm>
-            <a:off x="3870026" y="5979007"/>
+            <a:off x="3870026" y="4222780"/>
             <a:ext cx="0" cy="513527"/>
           </a:xfrm>
           <a:prstGeom prst="straightConnector1">
@@ -6844,7 +7652,7 @@
         </p:nvSpPr>
         <p:spPr>
           <a:xfrm>
-            <a:off x="2492270" y="3802694"/>
+            <a:off x="2492270" y="2046467"/>
             <a:ext cx="2755511" cy="714381"/>
           </a:xfrm>
           <a:prstGeom prst="roundRect">
@@ -6933,7 +7741,7 @@
         </p:nvCxnSpPr>
         <p:spPr>
           <a:xfrm>
-            <a:off x="3870026" y="4517075"/>
+            <a:off x="3870026" y="2760848"/>
             <a:ext cx="0" cy="752806"/>
           </a:xfrm>
           <a:prstGeom prst="straightConnector1">
@@ -6972,7 +7780,7 @@
         </p:nvSpPr>
         <p:spPr>
           <a:xfrm>
-            <a:off x="5566405" y="2847594"/>
+            <a:off x="5070743" y="450795"/>
             <a:ext cx="7805416" cy="584775"/>
           </a:xfrm>
           <a:prstGeom prst="rect">
@@ -6987,12 +7795,77 @@
           <a:lstStyle/>
           <a:p>
             <a:r>
-              <a:rPr lang="en-US" sz="3200" b="1" dirty="0">
+              <a:rPr lang="en-US" sz="3200" dirty="0">
                 <a:solidFill>
                   <a:srgbClr val="00B050"/>
                 </a:solidFill>
               </a:rPr>
               <a:t>Integration functions</a:t>
+            </a:r>
+          </a:p>
+        </p:txBody>
+      </p:sp>
+      <p:sp>
+        <p:nvSpPr>
+          <p:cNvPr id="33" name="Rectangle: Rounded Corners 32">
+            <a:extLst>
+              <a:ext uri="{FF2B5EF4-FFF2-40B4-BE49-F238E27FC236}">
+                <a16:creationId xmlns:a16="http://schemas.microsoft.com/office/drawing/2014/main" id="{10B777B3-119F-410B-BF47-0D05643DC540}"/>
+              </a:ext>
+            </a:extLst>
+          </p:cNvPr>
+          <p:cNvSpPr/>
+          <p:nvPr/>
+        </p:nvSpPr>
+        <p:spPr>
+          <a:xfrm>
+            <a:off x="5972751" y="7138408"/>
+            <a:ext cx="2057873" cy="1018896"/>
+          </a:xfrm>
+          <a:prstGeom prst="roundRect">
+            <a:avLst/>
+          </a:prstGeom>
+          <a:solidFill>
+            <a:schemeClr val="accent4">
+              <a:lumMod val="40000"/>
+              <a:lumOff val="60000"/>
+            </a:schemeClr>
+          </a:solidFill>
+          <a:ln>
+            <a:solidFill>
+              <a:schemeClr val="bg2">
+                <a:lumMod val="50000"/>
+              </a:schemeClr>
+            </a:solidFill>
+          </a:ln>
+        </p:spPr>
+        <p:style>
+          <a:lnRef idx="2">
+            <a:schemeClr val="accent1">
+              <a:shade val="50000"/>
+            </a:schemeClr>
+          </a:lnRef>
+          <a:fillRef idx="1">
+            <a:schemeClr val="accent1"/>
+          </a:fillRef>
+          <a:effectRef idx="0">
+            <a:schemeClr val="accent1"/>
+          </a:effectRef>
+          <a:fontRef idx="minor">
+            <a:schemeClr val="lt1"/>
+          </a:fontRef>
+        </p:style>
+        <p:txBody>
+          <a:bodyPr rtlCol="0" anchor="ctr"/>
+          <a:lstStyle/>
+          <a:p>
+            <a:r>
+              <a:rPr lang="en-US" sz="1200" dirty="0">
+                <a:solidFill>
+                  <a:schemeClr val="tx1"/>
+                </a:solidFill>
+              </a:rPr>
+              <a:t>Liz to fill this workflow out</a:t>
             </a:r>
           </a:p>
         </p:txBody>

</xml_diff>

<commit_message>
Added a new workflow for publication folder. Not sure what I updated on the old workflow but it seems to have changed.
</commit_message>
<xml_diff>
--- a/R_workflow.pptx
+++ b/R_workflow.pptx
@@ -115,6 +115,30 @@
 
 <file path=ppt/changesInfos/changesInfo1.xml><?xml version="1.0" encoding="utf-8"?>
 <pc:chgInfo xmlns:a="http://schemas.openxmlformats.org/drawingml/2006/main" xmlns:r="http://schemas.openxmlformats.org/officeDocument/2006/relationships" xmlns:ac="http://schemas.microsoft.com/office/drawing/2013/main/command" xmlns:pc="http://schemas.microsoft.com/office/powerpoint/2013/main/command">
+  <pc:docChgLst>
+    <pc:chgData name="Pien, Catarina L" userId="055f424c-5a88-4e6e-9e88-d4462ff2eeee" providerId="ADAL" clId="{7B5F0D2B-30A0-4D18-84FD-AB3B760EDA80}"/>
+    <pc:docChg chg="custSel modSld">
+      <pc:chgData name="Pien, Catarina L" userId="055f424c-5a88-4e6e-9e88-d4462ff2eeee" providerId="ADAL" clId="{7B5F0D2B-30A0-4D18-84FD-AB3B760EDA80}" dt="2023-06-12T16:44:29.376" v="1" actId="478"/>
+      <pc:docMkLst>
+        <pc:docMk/>
+      </pc:docMkLst>
+      <pc:sldChg chg="addSp delSp mod">
+        <pc:chgData name="Pien, Catarina L" userId="055f424c-5a88-4e6e-9e88-d4462ff2eeee" providerId="ADAL" clId="{7B5F0D2B-30A0-4D18-84FD-AB3B760EDA80}" dt="2023-06-12T16:44:29.376" v="1" actId="478"/>
+        <pc:sldMkLst>
+          <pc:docMk/>
+          <pc:sldMk cId="3351560325" sldId="257"/>
+        </pc:sldMkLst>
+        <pc:spChg chg="add del">
+          <ac:chgData name="Pien, Catarina L" userId="055f424c-5a88-4e6e-9e88-d4462ff2eeee" providerId="ADAL" clId="{7B5F0D2B-30A0-4D18-84FD-AB3B760EDA80}" dt="2023-06-12T16:44:29.376" v="1" actId="478"/>
+          <ac:spMkLst>
+            <pc:docMk/>
+            <pc:sldMk cId="3351560325" sldId="257"/>
+            <ac:spMk id="45" creationId="{D9478D31-9BD6-C59D-70A3-2E71A75D6483}"/>
+          </ac:spMkLst>
+        </pc:spChg>
+      </pc:sldChg>
+    </pc:docChg>
+  </pc:docChgLst>
   <pc:docChgLst>
     <pc:chgData name="Pien, Catarina L" userId="055f424c-5a88-4e6e-9e88-d4462ff2eeee" providerId="ADAL" clId="{B8F31FF9-3FFE-4F46-B083-0746F44D3189}"/>
     <pc:docChg chg="modSld">
@@ -840,7 +864,7 @@
           <a:p>
             <a:fld id="{C8820164-EF9E-45FC-8091-048CACBAAEBD}" type="datetimeFigureOut">
               <a:rPr lang="en-US" smtClean="0"/>
-              <a:t>9/27/2022</a:t>
+              <a:t>6/12/2023</a:t>
             </a:fld>
             <a:endParaRPr lang="en-US"/>
           </a:p>
@@ -1010,7 +1034,7 @@
           <a:p>
             <a:fld id="{C8820164-EF9E-45FC-8091-048CACBAAEBD}" type="datetimeFigureOut">
               <a:rPr lang="en-US" smtClean="0"/>
-              <a:t>9/27/2022</a:t>
+              <a:t>6/12/2023</a:t>
             </a:fld>
             <a:endParaRPr lang="en-US"/>
           </a:p>
@@ -1190,7 +1214,7 @@
           <a:p>
             <a:fld id="{C8820164-EF9E-45FC-8091-048CACBAAEBD}" type="datetimeFigureOut">
               <a:rPr lang="en-US" smtClean="0"/>
-              <a:t>9/27/2022</a:t>
+              <a:t>6/12/2023</a:t>
             </a:fld>
             <a:endParaRPr lang="en-US"/>
           </a:p>
@@ -1360,7 +1384,7 @@
           <a:p>
             <a:fld id="{C8820164-EF9E-45FC-8091-048CACBAAEBD}" type="datetimeFigureOut">
               <a:rPr lang="en-US" smtClean="0"/>
-              <a:t>9/27/2022</a:t>
+              <a:t>6/12/2023</a:t>
             </a:fld>
             <a:endParaRPr lang="en-US"/>
           </a:p>
@@ -1604,7 +1628,7 @@
           <a:p>
             <a:fld id="{C8820164-EF9E-45FC-8091-048CACBAAEBD}" type="datetimeFigureOut">
               <a:rPr lang="en-US" smtClean="0"/>
-              <a:t>9/27/2022</a:t>
+              <a:t>6/12/2023</a:t>
             </a:fld>
             <a:endParaRPr lang="en-US"/>
           </a:p>
@@ -1836,7 +1860,7 @@
           <a:p>
             <a:fld id="{C8820164-EF9E-45FC-8091-048CACBAAEBD}" type="datetimeFigureOut">
               <a:rPr lang="en-US" smtClean="0"/>
-              <a:t>9/27/2022</a:t>
+              <a:t>6/12/2023</a:t>
             </a:fld>
             <a:endParaRPr lang="en-US"/>
           </a:p>
@@ -2203,7 +2227,7 @@
           <a:p>
             <a:fld id="{C8820164-EF9E-45FC-8091-048CACBAAEBD}" type="datetimeFigureOut">
               <a:rPr lang="en-US" smtClean="0"/>
-              <a:t>9/27/2022</a:t>
+              <a:t>6/12/2023</a:t>
             </a:fld>
             <a:endParaRPr lang="en-US"/>
           </a:p>
@@ -2321,7 +2345,7 @@
           <a:p>
             <a:fld id="{C8820164-EF9E-45FC-8091-048CACBAAEBD}" type="datetimeFigureOut">
               <a:rPr lang="en-US" smtClean="0"/>
-              <a:t>9/27/2022</a:t>
+              <a:t>6/12/2023</a:t>
             </a:fld>
             <a:endParaRPr lang="en-US"/>
           </a:p>
@@ -2416,7 +2440,7 @@
           <a:p>
             <a:fld id="{C8820164-EF9E-45FC-8091-048CACBAAEBD}" type="datetimeFigureOut">
               <a:rPr lang="en-US" smtClean="0"/>
-              <a:t>9/27/2022</a:t>
+              <a:t>6/12/2023</a:t>
             </a:fld>
             <a:endParaRPr lang="en-US"/>
           </a:p>
@@ -2693,7 +2717,7 @@
           <a:p>
             <a:fld id="{C8820164-EF9E-45FC-8091-048CACBAAEBD}" type="datetimeFigureOut">
               <a:rPr lang="en-US" smtClean="0"/>
-              <a:t>9/27/2022</a:t>
+              <a:t>6/12/2023</a:t>
             </a:fld>
             <a:endParaRPr lang="en-US"/>
           </a:p>
@@ -2950,7 +2974,7 @@
           <a:p>
             <a:fld id="{C8820164-EF9E-45FC-8091-048CACBAAEBD}" type="datetimeFigureOut">
               <a:rPr lang="en-US" smtClean="0"/>
-              <a:t>9/27/2022</a:t>
+              <a:t>6/12/2023</a:t>
             </a:fld>
             <a:endParaRPr lang="en-US"/>
           </a:p>
@@ -3163,7 +3187,7 @@
           <a:p>
             <a:fld id="{C8820164-EF9E-45FC-8091-048CACBAAEBD}" type="datetimeFigureOut">
               <a:rPr lang="en-US" smtClean="0"/>
-              <a:t>9/27/2022</a:t>
+              <a:t>6/12/2023</a:t>
             </a:fld>
             <a:endParaRPr lang="en-US"/>
           </a:p>

</xml_diff>